<commit_message>
Updated css styles to hide items
</commit_message>
<xml_diff>
--- a/Wireframe.pptx
+++ b/Wireframe.pptx
@@ -7,6 +7,7 @@
   <p:sldIdLst>
     <p:sldId id="256" r:id="rId2"/>
     <p:sldId id="257" r:id="rId3"/>
+    <p:sldId id="258" r:id="rId4"/>
   </p:sldIdLst>
   <p:sldSz cx="12192000" cy="6858000"/>
   <p:notesSz cx="6858000" cy="9144000"/>
@@ -260,7 +261,7 @@
           <a:p>
             <a:fld id="{9F137A8D-0D52-2A45-B040-84B84C4A640E}" type="datetimeFigureOut">
               <a:rPr lang="en-US" smtClean="0"/>
-              <a:t>5/21/18</a:t>
+              <a:t>5/23/18</a:t>
             </a:fld>
             <a:endParaRPr lang="en-US"/>
           </a:p>
@@ -458,7 +459,7 @@
           <a:p>
             <a:fld id="{9F137A8D-0D52-2A45-B040-84B84C4A640E}" type="datetimeFigureOut">
               <a:rPr lang="en-US" smtClean="0"/>
-              <a:t>5/21/18</a:t>
+              <a:t>5/23/18</a:t>
             </a:fld>
             <a:endParaRPr lang="en-US"/>
           </a:p>
@@ -666,7 +667,7 @@
           <a:p>
             <a:fld id="{9F137A8D-0D52-2A45-B040-84B84C4A640E}" type="datetimeFigureOut">
               <a:rPr lang="en-US" smtClean="0"/>
-              <a:t>5/21/18</a:t>
+              <a:t>5/23/18</a:t>
             </a:fld>
             <a:endParaRPr lang="en-US"/>
           </a:p>
@@ -864,7 +865,7 @@
           <a:p>
             <a:fld id="{9F137A8D-0D52-2A45-B040-84B84C4A640E}" type="datetimeFigureOut">
               <a:rPr lang="en-US" smtClean="0"/>
-              <a:t>5/21/18</a:t>
+              <a:t>5/23/18</a:t>
             </a:fld>
             <a:endParaRPr lang="en-US"/>
           </a:p>
@@ -1139,7 +1140,7 @@
           <a:p>
             <a:fld id="{9F137A8D-0D52-2A45-B040-84B84C4A640E}" type="datetimeFigureOut">
               <a:rPr lang="en-US" smtClean="0"/>
-              <a:t>5/21/18</a:t>
+              <a:t>5/23/18</a:t>
             </a:fld>
             <a:endParaRPr lang="en-US"/>
           </a:p>
@@ -1404,7 +1405,7 @@
           <a:p>
             <a:fld id="{9F137A8D-0D52-2A45-B040-84B84C4A640E}" type="datetimeFigureOut">
               <a:rPr lang="en-US" smtClean="0"/>
-              <a:t>5/21/18</a:t>
+              <a:t>5/23/18</a:t>
             </a:fld>
             <a:endParaRPr lang="en-US"/>
           </a:p>
@@ -1816,7 +1817,7 @@
           <a:p>
             <a:fld id="{9F137A8D-0D52-2A45-B040-84B84C4A640E}" type="datetimeFigureOut">
               <a:rPr lang="en-US" smtClean="0"/>
-              <a:t>5/21/18</a:t>
+              <a:t>5/23/18</a:t>
             </a:fld>
             <a:endParaRPr lang="en-US"/>
           </a:p>
@@ -1957,7 +1958,7 @@
           <a:p>
             <a:fld id="{9F137A8D-0D52-2A45-B040-84B84C4A640E}" type="datetimeFigureOut">
               <a:rPr lang="en-US" smtClean="0"/>
-              <a:t>5/21/18</a:t>
+              <a:t>5/23/18</a:t>
             </a:fld>
             <a:endParaRPr lang="en-US"/>
           </a:p>
@@ -2070,7 +2071,7 @@
           <a:p>
             <a:fld id="{9F137A8D-0D52-2A45-B040-84B84C4A640E}" type="datetimeFigureOut">
               <a:rPr lang="en-US" smtClean="0"/>
-              <a:t>5/21/18</a:t>
+              <a:t>5/23/18</a:t>
             </a:fld>
             <a:endParaRPr lang="en-US"/>
           </a:p>
@@ -2381,7 +2382,7 @@
           <a:p>
             <a:fld id="{9F137A8D-0D52-2A45-B040-84B84C4A640E}" type="datetimeFigureOut">
               <a:rPr lang="en-US" smtClean="0"/>
-              <a:t>5/21/18</a:t>
+              <a:t>5/23/18</a:t>
             </a:fld>
             <a:endParaRPr lang="en-US"/>
           </a:p>
@@ -2669,7 +2670,7 @@
           <a:p>
             <a:fld id="{9F137A8D-0D52-2A45-B040-84B84C4A640E}" type="datetimeFigureOut">
               <a:rPr lang="en-US" smtClean="0"/>
-              <a:t>5/21/18</a:t>
+              <a:t>5/23/18</a:t>
             </a:fld>
             <a:endParaRPr lang="en-US"/>
           </a:p>
@@ -2910,7 +2911,7 @@
           <a:p>
             <a:fld id="{9F137A8D-0D52-2A45-B040-84B84C4A640E}" type="datetimeFigureOut">
               <a:rPr lang="en-US" smtClean="0"/>
-              <a:t>5/21/18</a:t>
+              <a:t>5/23/18</a:t>
             </a:fld>
             <a:endParaRPr lang="en-US"/>
           </a:p>
@@ -4795,7 +4796,15 @@
             </a:pPr>
             <a:r>
               <a:rPr lang="en-US" dirty="0"/>
-              <a:t>6 wrong choices hangs the man - game over.</a:t>
+              <a:t>8</a:t>
+            </a:r>
+            <a:r>
+              <a:rPr lang="en-US"/>
+              <a:t> </a:t>
+            </a:r>
+            <a:r>
+              <a:rPr lang="en-US" dirty="0"/>
+              <a:t>wrong choices hangs the man - game over.</a:t>
             </a:r>
           </a:p>
           <a:p>
@@ -5910,6 +5919,414 @@
     <p:extLst>
       <p:ext uri="{BB962C8B-B14F-4D97-AF65-F5344CB8AC3E}">
         <p14:creationId xmlns:p14="http://schemas.microsoft.com/office/powerpoint/2010/main" val="1797478196"/>
+      </p:ext>
+    </p:extLst>
+  </p:cSld>
+  <p:clrMapOvr>
+    <a:masterClrMapping/>
+  </p:clrMapOvr>
+</p:sld>
+</file>
+
+<file path=ppt/slides/slide3.xml><?xml version="1.0" encoding="utf-8"?>
+<p:sld xmlns:a="http://schemas.openxmlformats.org/drawingml/2006/main" xmlns:r="http://schemas.openxmlformats.org/officeDocument/2006/relationships" xmlns:p="http://schemas.openxmlformats.org/presentationml/2006/main">
+  <p:cSld>
+    <p:spTree>
+      <p:nvGrpSpPr>
+        <p:cNvPr id="1" name=""/>
+        <p:cNvGrpSpPr/>
+        <p:nvPr/>
+      </p:nvGrpSpPr>
+      <p:grpSpPr>
+        <a:xfrm>
+          <a:off x="0" y="0"/>
+          <a:ext cx="0" cy="0"/>
+          <a:chOff x="0" y="0"/>
+          <a:chExt cx="0" cy="0"/>
+        </a:xfrm>
+      </p:grpSpPr>
+      <p:pic>
+        <p:nvPicPr>
+          <p:cNvPr id="4" name="Picture 3">
+            <a:extLst>
+              <a:ext uri="{FF2B5EF4-FFF2-40B4-BE49-F238E27FC236}">
+                <a16:creationId xmlns:a16="http://schemas.microsoft.com/office/drawing/2014/main" id="{A5D81B0F-5487-E145-A95A-F6ECCE638CFD}"/>
+              </a:ext>
+            </a:extLst>
+          </p:cNvPr>
+          <p:cNvPicPr>
+            <a:picLocks noChangeAspect="1"/>
+          </p:cNvPicPr>
+          <p:nvPr/>
+        </p:nvPicPr>
+        <p:blipFill>
+          <a:blip r:embed="rId2"/>
+          <a:stretch>
+            <a:fillRect/>
+          </a:stretch>
+        </p:blipFill>
+        <p:spPr>
+          <a:xfrm>
+            <a:off x="3575050" y="546100"/>
+            <a:ext cx="5041900" cy="5765800"/>
+          </a:xfrm>
+          <a:prstGeom prst="rect">
+            <a:avLst/>
+          </a:prstGeom>
+        </p:spPr>
+      </p:pic>
+      <p:cxnSp>
+        <p:nvCxnSpPr>
+          <p:cNvPr id="6" name="Straight Connector 5">
+            <a:extLst>
+              <a:ext uri="{FF2B5EF4-FFF2-40B4-BE49-F238E27FC236}">
+                <a16:creationId xmlns:a16="http://schemas.microsoft.com/office/drawing/2014/main" id="{4B4DD22F-BBEC-F346-9EEB-7AFF2C12F785}"/>
+              </a:ext>
+            </a:extLst>
+          </p:cNvPr>
+          <p:cNvCxnSpPr/>
+          <p:nvPr/>
+        </p:nvCxnSpPr>
+        <p:spPr>
+          <a:xfrm>
+            <a:off x="2537460" y="3429000"/>
+            <a:ext cx="7978140" cy="0"/>
+          </a:xfrm>
+          <a:prstGeom prst="line">
+            <a:avLst/>
+          </a:prstGeom>
+        </p:spPr>
+        <p:style>
+          <a:lnRef idx="1">
+            <a:schemeClr val="accent1"/>
+          </a:lnRef>
+          <a:fillRef idx="0">
+            <a:schemeClr val="accent1"/>
+          </a:fillRef>
+          <a:effectRef idx="0">
+            <a:schemeClr val="accent1"/>
+          </a:effectRef>
+          <a:fontRef idx="minor">
+            <a:schemeClr val="tx1"/>
+          </a:fontRef>
+        </p:style>
+      </p:cxnSp>
+      <p:cxnSp>
+        <p:nvCxnSpPr>
+          <p:cNvPr id="7" name="Straight Connector 6">
+            <a:extLst>
+              <a:ext uri="{FF2B5EF4-FFF2-40B4-BE49-F238E27FC236}">
+                <a16:creationId xmlns:a16="http://schemas.microsoft.com/office/drawing/2014/main" id="{4F6874DF-CF61-F346-9507-DF8669DB34D0}"/>
+              </a:ext>
+            </a:extLst>
+          </p:cNvPr>
+          <p:cNvCxnSpPr/>
+          <p:nvPr/>
+        </p:nvCxnSpPr>
+        <p:spPr>
+          <a:xfrm>
+            <a:off x="2484120" y="4415790"/>
+            <a:ext cx="7978140" cy="0"/>
+          </a:xfrm>
+          <a:prstGeom prst="line">
+            <a:avLst/>
+          </a:prstGeom>
+        </p:spPr>
+        <p:style>
+          <a:lnRef idx="1">
+            <a:schemeClr val="accent1"/>
+          </a:lnRef>
+          <a:fillRef idx="0">
+            <a:schemeClr val="accent1"/>
+          </a:fillRef>
+          <a:effectRef idx="0">
+            <a:schemeClr val="accent1"/>
+          </a:effectRef>
+          <a:fontRef idx="minor">
+            <a:schemeClr val="tx1"/>
+          </a:fontRef>
+        </p:style>
+      </p:cxnSp>
+      <p:cxnSp>
+        <p:nvCxnSpPr>
+          <p:cNvPr id="8" name="Straight Connector 7">
+            <a:extLst>
+              <a:ext uri="{FF2B5EF4-FFF2-40B4-BE49-F238E27FC236}">
+                <a16:creationId xmlns:a16="http://schemas.microsoft.com/office/drawing/2014/main" id="{C9F24312-DA9D-6A40-AACA-8D2EB107C02E}"/>
+              </a:ext>
+            </a:extLst>
+          </p:cNvPr>
+          <p:cNvCxnSpPr/>
+          <p:nvPr/>
+        </p:nvCxnSpPr>
+        <p:spPr>
+          <a:xfrm>
+            <a:off x="2503170" y="1508760"/>
+            <a:ext cx="7978140" cy="0"/>
+          </a:xfrm>
+          <a:prstGeom prst="line">
+            <a:avLst/>
+          </a:prstGeom>
+        </p:spPr>
+        <p:style>
+          <a:lnRef idx="1">
+            <a:schemeClr val="accent1"/>
+          </a:lnRef>
+          <a:fillRef idx="0">
+            <a:schemeClr val="accent1"/>
+          </a:fillRef>
+          <a:effectRef idx="0">
+            <a:schemeClr val="accent1"/>
+          </a:effectRef>
+          <a:fontRef idx="minor">
+            <a:schemeClr val="tx1"/>
+          </a:fontRef>
+        </p:style>
+      </p:cxnSp>
+      <p:cxnSp>
+        <p:nvCxnSpPr>
+          <p:cNvPr id="9" name="Straight Connector 8">
+            <a:extLst>
+              <a:ext uri="{FF2B5EF4-FFF2-40B4-BE49-F238E27FC236}">
+                <a16:creationId xmlns:a16="http://schemas.microsoft.com/office/drawing/2014/main" id="{AEA65B16-8C02-A54B-AA1F-E97378585F9B}"/>
+              </a:ext>
+            </a:extLst>
+          </p:cNvPr>
+          <p:cNvCxnSpPr/>
+          <p:nvPr/>
+        </p:nvCxnSpPr>
+        <p:spPr>
+          <a:xfrm>
+            <a:off x="2346960" y="2472690"/>
+            <a:ext cx="7978140" cy="0"/>
+          </a:xfrm>
+          <a:prstGeom prst="line">
+            <a:avLst/>
+          </a:prstGeom>
+        </p:spPr>
+        <p:style>
+          <a:lnRef idx="1">
+            <a:schemeClr val="accent1"/>
+          </a:lnRef>
+          <a:fillRef idx="0">
+            <a:schemeClr val="accent1"/>
+          </a:fillRef>
+          <a:effectRef idx="0">
+            <a:schemeClr val="accent1"/>
+          </a:effectRef>
+          <a:fontRef idx="minor">
+            <a:schemeClr val="tx1"/>
+          </a:fontRef>
+        </p:style>
+      </p:cxnSp>
+      <p:cxnSp>
+        <p:nvCxnSpPr>
+          <p:cNvPr id="10" name="Straight Connector 9">
+            <a:extLst>
+              <a:ext uri="{FF2B5EF4-FFF2-40B4-BE49-F238E27FC236}">
+                <a16:creationId xmlns:a16="http://schemas.microsoft.com/office/drawing/2014/main" id="{7C1F04F7-B1B5-B346-9D46-BCAAF3B893E4}"/>
+              </a:ext>
+            </a:extLst>
+          </p:cNvPr>
+          <p:cNvCxnSpPr/>
+          <p:nvPr/>
+        </p:nvCxnSpPr>
+        <p:spPr>
+          <a:xfrm>
+            <a:off x="2651760" y="5406390"/>
+            <a:ext cx="7978140" cy="0"/>
+          </a:xfrm>
+          <a:prstGeom prst="line">
+            <a:avLst/>
+          </a:prstGeom>
+        </p:spPr>
+        <p:style>
+          <a:lnRef idx="1">
+            <a:schemeClr val="accent1"/>
+          </a:lnRef>
+          <a:fillRef idx="0">
+            <a:schemeClr val="accent1"/>
+          </a:fillRef>
+          <a:effectRef idx="0">
+            <a:schemeClr val="accent1"/>
+          </a:effectRef>
+          <a:fontRef idx="minor">
+            <a:schemeClr val="tx1"/>
+          </a:fontRef>
+        </p:style>
+      </p:cxnSp>
+      <p:sp>
+        <p:nvSpPr>
+          <p:cNvPr id="11" name="TextBox 10">
+            <a:extLst>
+              <a:ext uri="{FF2B5EF4-FFF2-40B4-BE49-F238E27FC236}">
+                <a16:creationId xmlns:a16="http://schemas.microsoft.com/office/drawing/2014/main" id="{53A0E203-6EF5-E244-9328-D70A36E1EAD9}"/>
+              </a:ext>
+            </a:extLst>
+          </p:cNvPr>
+          <p:cNvSpPr txBox="1"/>
+          <p:nvPr/>
+        </p:nvSpPr>
+        <p:spPr>
+          <a:xfrm>
+            <a:off x="3766185" y="700088"/>
+            <a:ext cx="4663440" cy="646331"/>
+          </a:xfrm>
+          <a:prstGeom prst="rect">
+            <a:avLst/>
+          </a:prstGeom>
+          <a:solidFill>
+            <a:schemeClr val="accent1">
+              <a:alpha val="55000"/>
+            </a:schemeClr>
+          </a:solidFill>
+          <a:ln w="22225" cap="rnd">
+            <a:solidFill>
+              <a:schemeClr val="accent1"/>
+            </a:solidFill>
+          </a:ln>
+          <a:effectLst>
+            <a:outerShdw blurRad="50800" dist="38100" dir="2700000" algn="tl" rotWithShape="0">
+              <a:prstClr val="black">
+                <a:alpha val="40000"/>
+              </a:prstClr>
+            </a:outerShdw>
+          </a:effectLst>
+        </p:spPr>
+        <p:txBody>
+          <a:bodyPr wrap="square" rtlCol="0">
+            <a:spAutoFit/>
+          </a:bodyPr>
+          <a:lstStyle/>
+          <a:p>
+            <a:pPr algn="ctr"/>
+            <a:r>
+              <a:rPr lang="en-US" sz="3600" b="1" dirty="0">
+                <a:solidFill>
+                  <a:schemeClr val="bg1"/>
+                </a:solidFill>
+              </a:rPr>
+              <a:t>HANG IN THERE!</a:t>
+            </a:r>
+          </a:p>
+        </p:txBody>
+      </p:sp>
+      <p:sp>
+        <p:nvSpPr>
+          <p:cNvPr id="13" name="TextBox 12">
+            <a:extLst>
+              <a:ext uri="{FF2B5EF4-FFF2-40B4-BE49-F238E27FC236}">
+                <a16:creationId xmlns:a16="http://schemas.microsoft.com/office/drawing/2014/main" id="{E6181F21-F649-4E46-BEE8-6659BACEA922}"/>
+              </a:ext>
+            </a:extLst>
+          </p:cNvPr>
+          <p:cNvSpPr txBox="1"/>
+          <p:nvPr/>
+        </p:nvSpPr>
+        <p:spPr>
+          <a:xfrm>
+            <a:off x="3678555" y="2635568"/>
+            <a:ext cx="1727835" cy="584775"/>
+          </a:xfrm>
+          <a:prstGeom prst="rect">
+            <a:avLst/>
+          </a:prstGeom>
+          <a:solidFill>
+            <a:schemeClr val="accent1">
+              <a:alpha val="55000"/>
+            </a:schemeClr>
+          </a:solidFill>
+          <a:ln w="22225" cap="rnd">
+            <a:solidFill>
+              <a:schemeClr val="accent1"/>
+            </a:solidFill>
+          </a:ln>
+          <a:effectLst>
+            <a:outerShdw blurRad="50800" dist="38100" dir="2700000" algn="tl" rotWithShape="0">
+              <a:prstClr val="black">
+                <a:alpha val="40000"/>
+              </a:prstClr>
+            </a:outerShdw>
+          </a:effectLst>
+        </p:spPr>
+        <p:txBody>
+          <a:bodyPr wrap="square" rtlCol="0">
+            <a:spAutoFit/>
+          </a:bodyPr>
+          <a:lstStyle/>
+          <a:p>
+            <a:pPr algn="ctr"/>
+            <a:r>
+              <a:rPr lang="en-US" sz="3200" b="1" dirty="0">
+                <a:solidFill>
+                  <a:schemeClr val="bg1"/>
+                </a:solidFill>
+              </a:rPr>
+              <a:t>Incorrect</a:t>
+            </a:r>
+          </a:p>
+        </p:txBody>
+      </p:sp>
+      <p:sp>
+        <p:nvSpPr>
+          <p:cNvPr id="14" name="TextBox 13">
+            <a:extLst>
+              <a:ext uri="{FF2B5EF4-FFF2-40B4-BE49-F238E27FC236}">
+                <a16:creationId xmlns:a16="http://schemas.microsoft.com/office/drawing/2014/main" id="{D8C5C879-9E33-5144-9599-C48F3FD82BFC}"/>
+              </a:ext>
+            </a:extLst>
+          </p:cNvPr>
+          <p:cNvSpPr txBox="1"/>
+          <p:nvPr/>
+        </p:nvSpPr>
+        <p:spPr>
+          <a:xfrm>
+            <a:off x="6859905" y="2686050"/>
+            <a:ext cx="1609725" cy="523220"/>
+          </a:xfrm>
+          <a:prstGeom prst="rect">
+            <a:avLst/>
+          </a:prstGeom>
+          <a:solidFill>
+            <a:schemeClr val="accent1">
+              <a:alpha val="55000"/>
+            </a:schemeClr>
+          </a:solidFill>
+          <a:ln w="22225" cap="rnd">
+            <a:solidFill>
+              <a:schemeClr val="accent1"/>
+            </a:solidFill>
+          </a:ln>
+          <a:effectLst>
+            <a:outerShdw blurRad="50800" dist="38100" dir="2700000" algn="tl" rotWithShape="0">
+              <a:prstClr val="black">
+                <a:alpha val="40000"/>
+              </a:prstClr>
+            </a:outerShdw>
+          </a:effectLst>
+        </p:spPr>
+        <p:txBody>
+          <a:bodyPr wrap="square" rtlCol="0">
+            <a:spAutoFit/>
+          </a:bodyPr>
+          <a:lstStyle/>
+          <a:p>
+            <a:pPr algn="ctr"/>
+            <a:r>
+              <a:rPr lang="en-US" sz="2800" b="1" dirty="0">
+                <a:solidFill>
+                  <a:schemeClr val="bg1"/>
+                </a:solidFill>
+              </a:rPr>
+              <a:t>Try Again</a:t>
+            </a:r>
+          </a:p>
+        </p:txBody>
+      </p:sp>
+    </p:spTree>
+    <p:extLst>
+      <p:ext uri="{BB962C8B-B14F-4D97-AF65-F5344CB8AC3E}">
+        <p14:creationId xmlns:p14="http://schemas.microsoft.com/office/powerpoint/2010/main" val="2185930266"/>
       </p:ext>
     </p:extLst>
   </p:cSld>

</xml_diff>